<commit_message>
Corretti svariati typos e errori di nomi
</commit_message>
<xml_diff>
--- a/BC4/Bozza.pptx
+++ b/BC4/Bozza.pptx
@@ -2995,7 +2995,7 @@
           <a:p>
             <a:fld id="{9556681E-2147-4F5F-ADE4-85B7757EC00E}" type="datetimeFigureOut">
               <a:rPr lang="it-IT" smtClean="0"/>
-              <a:t>09/05/2023</a:t>
+              <a:t>10/05/2023</a:t>
             </a:fld>
             <a:endParaRPr lang="it-IT"/>
           </a:p>
@@ -3531,7 +3531,7 @@
           <a:p>
             <a:fld id="{1A270AA3-85FD-4336-B0B7-87033A430298}" type="datetimeFigureOut">
               <a:rPr lang="it-IT" smtClean="0"/>
-              <a:t>09/05/2023</a:t>
+              <a:t>10/05/2023</a:t>
             </a:fld>
             <a:endParaRPr lang="it-IT" dirty="0"/>
           </a:p>
@@ -3829,7 +3829,7 @@
           <a:p>
             <a:fld id="{1A270AA3-85FD-4336-B0B7-87033A430298}" type="datetimeFigureOut">
               <a:rPr lang="it-IT" smtClean="0"/>
-              <a:t>09/05/2023</a:t>
+              <a:t>10/05/2023</a:t>
             </a:fld>
             <a:endParaRPr lang="it-IT" dirty="0"/>
           </a:p>
@@ -4021,7 +4021,7 @@
           <a:p>
             <a:fld id="{1A270AA3-85FD-4336-B0B7-87033A430298}" type="datetimeFigureOut">
               <a:rPr lang="it-IT" smtClean="0"/>
-              <a:t>09/05/2023</a:t>
+              <a:t>10/05/2023</a:t>
             </a:fld>
             <a:endParaRPr lang="it-IT" dirty="0"/>
           </a:p>
@@ -4282,7 +4282,7 @@
           <a:p>
             <a:fld id="{1A270AA3-85FD-4336-B0B7-87033A430298}" type="datetimeFigureOut">
               <a:rPr lang="it-IT" smtClean="0"/>
-              <a:t>09/05/2023</a:t>
+              <a:t>10/05/2023</a:t>
             </a:fld>
             <a:endParaRPr lang="it-IT" dirty="0"/>
           </a:p>
@@ -4706,7 +4706,7 @@
           <a:p>
             <a:fld id="{1A270AA3-85FD-4336-B0B7-87033A430298}" type="datetimeFigureOut">
               <a:rPr lang="it-IT" smtClean="0"/>
-              <a:t>09/05/2023</a:t>
+              <a:t>10/05/2023</a:t>
             </a:fld>
             <a:endParaRPr lang="it-IT" dirty="0"/>
           </a:p>
@@ -5243,7 +5243,7 @@
           <a:p>
             <a:fld id="{1A270AA3-85FD-4336-B0B7-87033A430298}" type="datetimeFigureOut">
               <a:rPr lang="it-IT" smtClean="0"/>
-              <a:t>09/05/2023</a:t>
+              <a:t>10/05/2023</a:t>
             </a:fld>
             <a:endParaRPr lang="it-IT" dirty="0"/>
           </a:p>
@@ -6107,7 +6107,7 @@
           <a:p>
             <a:fld id="{1A270AA3-85FD-4336-B0B7-87033A430298}" type="datetimeFigureOut">
               <a:rPr lang="it-IT" smtClean="0"/>
-              <a:t>09/05/2023</a:t>
+              <a:t>10/05/2023</a:t>
             </a:fld>
             <a:endParaRPr lang="it-IT" dirty="0"/>
           </a:p>
@@ -6277,7 +6277,7 @@
           <a:p>
             <a:fld id="{1A270AA3-85FD-4336-B0B7-87033A430298}" type="datetimeFigureOut">
               <a:rPr lang="it-IT" smtClean="0"/>
-              <a:t>09/05/2023</a:t>
+              <a:t>10/05/2023</a:t>
             </a:fld>
             <a:endParaRPr lang="it-IT" dirty="0"/>
           </a:p>
@@ -6461,7 +6461,7 @@
           <a:p>
             <a:fld id="{1A270AA3-85FD-4336-B0B7-87033A430298}" type="datetimeFigureOut">
               <a:rPr lang="it-IT" smtClean="0"/>
-              <a:t>09/05/2023</a:t>
+              <a:t>10/05/2023</a:t>
             </a:fld>
             <a:endParaRPr lang="it-IT" dirty="0"/>
           </a:p>
@@ -6631,7 +6631,7 @@
           <a:p>
             <a:fld id="{1A270AA3-85FD-4336-B0B7-87033A430298}" type="datetimeFigureOut">
               <a:rPr lang="it-IT" smtClean="0"/>
-              <a:t>09/05/2023</a:t>
+              <a:t>10/05/2023</a:t>
             </a:fld>
             <a:endParaRPr lang="it-IT" dirty="0"/>
           </a:p>
@@ -6875,7 +6875,7 @@
           <a:p>
             <a:fld id="{1A270AA3-85FD-4336-B0B7-87033A430298}" type="datetimeFigureOut">
               <a:rPr lang="it-IT" smtClean="0"/>
-              <a:t>09/05/2023</a:t>
+              <a:t>10/05/2023</a:t>
             </a:fld>
             <a:endParaRPr lang="it-IT" dirty="0"/>
           </a:p>
@@ -7111,7 +7111,7 @@
           <a:p>
             <a:fld id="{1A270AA3-85FD-4336-B0B7-87033A430298}" type="datetimeFigureOut">
               <a:rPr lang="it-IT" smtClean="0"/>
-              <a:t>09/05/2023</a:t>
+              <a:t>10/05/2023</a:t>
             </a:fld>
             <a:endParaRPr lang="it-IT" dirty="0"/>
           </a:p>
@@ -7577,7 +7577,7 @@
           <a:p>
             <a:fld id="{1A270AA3-85FD-4336-B0B7-87033A430298}" type="datetimeFigureOut">
               <a:rPr lang="it-IT" smtClean="0"/>
-              <a:t>09/05/2023</a:t>
+              <a:t>10/05/2023</a:t>
             </a:fld>
             <a:endParaRPr lang="it-IT" dirty="0"/>
           </a:p>
@@ -7695,7 +7695,7 @@
           <a:p>
             <a:fld id="{1A270AA3-85FD-4336-B0B7-87033A430298}" type="datetimeFigureOut">
               <a:rPr lang="it-IT" smtClean="0"/>
-              <a:t>09/05/2023</a:t>
+              <a:t>10/05/2023</a:t>
             </a:fld>
             <a:endParaRPr lang="it-IT" dirty="0"/>
           </a:p>
@@ -7790,7 +7790,7 @@
           <a:p>
             <a:fld id="{1A270AA3-85FD-4336-B0B7-87033A430298}" type="datetimeFigureOut">
               <a:rPr lang="it-IT" smtClean="0"/>
-              <a:t>09/05/2023</a:t>
+              <a:t>10/05/2023</a:t>
             </a:fld>
             <a:endParaRPr lang="it-IT" dirty="0"/>
           </a:p>
@@ -8045,7 +8045,7 @@
           <a:p>
             <a:fld id="{1A270AA3-85FD-4336-B0B7-87033A430298}" type="datetimeFigureOut">
               <a:rPr lang="it-IT" smtClean="0"/>
-              <a:t>09/05/2023</a:t>
+              <a:t>10/05/2023</a:t>
             </a:fld>
             <a:endParaRPr lang="it-IT" dirty="0"/>
           </a:p>
@@ -8345,7 +8345,7 @@
           <a:p>
             <a:fld id="{1A270AA3-85FD-4336-B0B7-87033A430298}" type="datetimeFigureOut">
               <a:rPr lang="it-IT" smtClean="0"/>
-              <a:t>09/05/2023</a:t>
+              <a:t>10/05/2023</a:t>
             </a:fld>
             <a:endParaRPr lang="it-IT" dirty="0"/>
           </a:p>
@@ -8579,7 +8579,7 @@
           <a:p>
             <a:fld id="{1A270AA3-85FD-4336-B0B7-87033A430298}" type="datetimeFigureOut">
               <a:rPr lang="it-IT" smtClean="0"/>
-              <a:t>09/05/2023</a:t>
+              <a:t>10/05/2023</a:t>
             </a:fld>
             <a:endParaRPr lang="it-IT" dirty="0"/>
           </a:p>
@@ -13240,7 +13240,7 @@
             </a:r>
             <a:r>
               <a:rPr lang="it-IT" dirty="0" err="1"/>
-              <a:t>choosen</a:t>
+              <a:t>chosen</a:t>
             </a:r>
             <a:r>
               <a:rPr lang="it-IT" dirty="0"/>
@@ -13312,7 +13312,7 @@
             </a:r>
             <a:r>
               <a:rPr lang="it-IT" dirty="0"/>
-              <a:t>by a </a:t>
+              <a:t>with a </a:t>
             </a:r>
             <a:r>
               <a:rPr lang="it-IT" dirty="0" err="1"/>
@@ -15183,7 +15183,7 @@
             </a:r>
             <a:r>
               <a:rPr lang="it-IT" dirty="0"/>
-              <a:t>( </a:t>
+              <a:t>(</a:t>
             </a:r>
             <a:r>
               <a:rPr lang="it-IT" dirty="0" err="1"/>
@@ -15418,7 +15418,7 @@
             </a:r>
             <a:r>
               <a:rPr lang="it-IT" b="1" dirty="0" err="1"/>
-              <a:t>error</a:t>
+              <a:t>Error</a:t>
             </a:r>
             <a:r>
               <a:rPr lang="it-IT" b="1" dirty="0"/>
@@ -15426,7 +15426,7 @@
             </a:r>
             <a:r>
               <a:rPr lang="it-IT" b="1" dirty="0" err="1"/>
-              <a:t>Volatibility</a:t>
+              <a:t>Volatility</a:t>
             </a:r>
             <a:r>
               <a:rPr lang="it-IT" b="1" dirty="0"/>
@@ -15490,7 +15490,32 @@
             </a:r>
             <a:r>
               <a:rPr lang="it-IT" dirty="0" err="1"/>
-              <a:t>it</a:t>
+              <a:t>is</a:t>
+            </a:r>
+            <a:r>
+              <a:rPr lang="it-IT" dirty="0"/>
+              <a:t> </a:t>
+            </a:r>
+            <a:r>
+              <a:rPr lang="it-IT" dirty="0" err="1"/>
+              <a:t>designed</a:t>
+            </a:r>
+            <a:r>
+              <a:rPr lang="it-IT" dirty="0"/>
+              <a:t> to track. </a:t>
+            </a:r>
+          </a:p>
+          <a:p>
+            <a:endParaRPr lang="it-IT" dirty="0"/>
+          </a:p>
+          <a:p>
+            <a:r>
+              <a:rPr lang="it-IT" dirty="0"/>
+              <a:t>Here the best </a:t>
+            </a:r>
+            <a:r>
+              <a:rPr lang="it-IT" dirty="0" err="1"/>
+              <a:t>value</a:t>
             </a:r>
             <a:r>
               <a:rPr lang="it-IT" dirty="0"/>
@@ -15506,11 +15531,19 @@
             </a:r>
             <a:r>
               <a:rPr lang="it-IT" dirty="0" err="1"/>
-              <a:t>designed</a:t>
-            </a:r>
-            <a:r>
-              <a:rPr lang="it-IT" dirty="0"/>
-              <a:t> to track. </a:t>
+              <a:t>given</a:t>
+            </a:r>
+            <a:r>
+              <a:rPr lang="it-IT" dirty="0"/>
+              <a:t> by alpha = 0,5 and </a:t>
+            </a:r>
+            <a:r>
+              <a:rPr lang="it-IT" dirty="0" err="1"/>
+              <a:t>rw</a:t>
+            </a:r>
+            <a:r>
+              <a:rPr lang="it-IT" dirty="0"/>
+              <a:t> =208.</a:t>
             </a:r>
           </a:p>
           <a:p>
@@ -15518,12 +15551,40 @@
           </a:p>
           <a:p>
             <a:r>
-              <a:rPr lang="it-IT" dirty="0"/>
-              <a:t>Here the best </a:t>
-            </a:r>
-            <a:r>
               <a:rPr lang="it-IT" dirty="0" err="1"/>
-              <a:t>value</a:t>
+              <a:t>Then</a:t>
+            </a:r>
+            <a:r>
+              <a:rPr lang="it-IT" dirty="0"/>
+              <a:t>, </a:t>
+            </a:r>
+            <a:r>
+              <a:rPr lang="it-IT" dirty="0" err="1"/>
+              <a:t>we</a:t>
+            </a:r>
+            <a:r>
+              <a:rPr lang="it-IT" dirty="0"/>
+              <a:t> </a:t>
+            </a:r>
+            <a:r>
+              <a:rPr lang="it-IT" dirty="0" err="1"/>
+              <a:t>consider</a:t>
+            </a:r>
+            <a:r>
+              <a:rPr lang="it-IT" dirty="0"/>
+              <a:t> the </a:t>
+            </a:r>
+            <a:r>
+              <a:rPr lang="it-IT" b="1" dirty="0"/>
+              <a:t>Turnover</a:t>
+            </a:r>
+            <a:r>
+              <a:rPr lang="it-IT" dirty="0"/>
+              <a:t>, </a:t>
+            </a:r>
+            <a:r>
+              <a:rPr lang="it-IT" dirty="0" err="1"/>
+              <a:t>that</a:t>
             </a:r>
             <a:r>
               <a:rPr lang="it-IT" dirty="0"/>
@@ -15535,75 +15596,6 @@
             </a:r>
             <a:r>
               <a:rPr lang="it-IT" dirty="0"/>
-              <a:t> </a:t>
-            </a:r>
-            <a:r>
-              <a:rPr lang="it-IT" dirty="0" err="1"/>
-              <a:t>given</a:t>
-            </a:r>
-            <a:r>
-              <a:rPr lang="it-IT" dirty="0"/>
-              <a:t> by alpha = 0,5 and </a:t>
-            </a:r>
-            <a:r>
-              <a:rPr lang="it-IT" dirty="0" err="1"/>
-              <a:t>rw</a:t>
-            </a:r>
-            <a:r>
-              <a:rPr lang="it-IT" dirty="0"/>
-              <a:t> =208.</a:t>
-            </a:r>
-          </a:p>
-          <a:p>
-            <a:endParaRPr lang="it-IT" dirty="0"/>
-          </a:p>
-          <a:p>
-            <a:r>
-              <a:rPr lang="it-IT" dirty="0" err="1"/>
-              <a:t>Then</a:t>
-            </a:r>
-            <a:r>
-              <a:rPr lang="it-IT" dirty="0"/>
-              <a:t>, </a:t>
-            </a:r>
-            <a:r>
-              <a:rPr lang="it-IT" dirty="0" err="1"/>
-              <a:t>we</a:t>
-            </a:r>
-            <a:r>
-              <a:rPr lang="it-IT" dirty="0"/>
-              <a:t> </a:t>
-            </a:r>
-            <a:r>
-              <a:rPr lang="it-IT" dirty="0" err="1"/>
-              <a:t>consider</a:t>
-            </a:r>
-            <a:r>
-              <a:rPr lang="it-IT" dirty="0"/>
-              <a:t> the </a:t>
-            </a:r>
-            <a:r>
-              <a:rPr lang="it-IT" b="1" dirty="0"/>
-              <a:t>Turnover</a:t>
-            </a:r>
-            <a:r>
-              <a:rPr lang="it-IT" dirty="0"/>
-              <a:t>, </a:t>
-            </a:r>
-            <a:r>
-              <a:rPr lang="it-IT" dirty="0" err="1"/>
-              <a:t>that</a:t>
-            </a:r>
-            <a:r>
-              <a:rPr lang="it-IT" dirty="0"/>
-              <a:t> </a:t>
-            </a:r>
-            <a:r>
-              <a:rPr lang="it-IT" dirty="0" err="1"/>
-              <a:t>is</a:t>
-            </a:r>
-            <a:r>
-              <a:rPr lang="it-IT" dirty="0"/>
               <a:t> the sum of the </a:t>
             </a:r>
             <a:r>
@@ -15681,7 +15673,7 @@
             </a:r>
             <a:r>
               <a:rPr lang="it-IT" b="1" dirty="0"/>
-              <a:t> = 0,004 </a:t>
+              <a:t> = 0,004, </a:t>
             </a:r>
             <a:r>
               <a:rPr lang="it-IT" dirty="0" err="1"/>
@@ -17227,7 +17219,7 @@
             </a:pPr>
             <a:r>
               <a:rPr lang="en-US" sz="1800" b="0" i="0" u="none" strike="noStrike" dirty="0"/>
-              <a:t>Using a decay factor the </a:t>
+              <a:t>Using a decay factor, the </a:t>
             </a:r>
             <a:r>
               <a:rPr lang="en-US" sz="1800" b="1" i="0" u="none" strike="noStrike" dirty="0"/>

</xml_diff>